<commit_message>
vault backup: 2024-05-02 12:40:52
</commit_message>
<xml_diff>
--- a/06-ppt/discussion/TSN.pptx
+++ b/06-ppt/discussion/TSN.pptx
@@ -277,7 +277,7 @@
           <a:p>
             <a:fld id="{51FD5836-1B78-4E70-983F-F8F353C30F27}" type="datetimeFigureOut">
               <a:rPr lang="zh-CN" altLang="en-US" smtClean="0"/>
-              <a:t>2024/5/1</a:t>
+              <a:t>2024/5/2</a:t>
             </a:fld>
             <a:endParaRPr lang="zh-CN" altLang="en-US"/>
           </a:p>
@@ -475,7 +475,7 @@
           <a:p>
             <a:fld id="{51FD5836-1B78-4E70-983F-F8F353C30F27}" type="datetimeFigureOut">
               <a:rPr lang="zh-CN" altLang="en-US" smtClean="0"/>
-              <a:t>2024/5/1</a:t>
+              <a:t>2024/5/2</a:t>
             </a:fld>
             <a:endParaRPr lang="zh-CN" altLang="en-US"/>
           </a:p>
@@ -683,7 +683,7 @@
           <a:p>
             <a:fld id="{51FD5836-1B78-4E70-983F-F8F353C30F27}" type="datetimeFigureOut">
               <a:rPr lang="zh-CN" altLang="en-US" smtClean="0"/>
-              <a:t>2024/5/1</a:t>
+              <a:t>2024/5/2</a:t>
             </a:fld>
             <a:endParaRPr lang="zh-CN" altLang="en-US"/>
           </a:p>
@@ -881,7 +881,7 @@
           <a:p>
             <a:fld id="{51FD5836-1B78-4E70-983F-F8F353C30F27}" type="datetimeFigureOut">
               <a:rPr lang="zh-CN" altLang="en-US" smtClean="0"/>
-              <a:t>2024/5/1</a:t>
+              <a:t>2024/5/2</a:t>
             </a:fld>
             <a:endParaRPr lang="zh-CN" altLang="en-US"/>
           </a:p>
@@ -1156,7 +1156,7 @@
           <a:p>
             <a:fld id="{51FD5836-1B78-4E70-983F-F8F353C30F27}" type="datetimeFigureOut">
               <a:rPr lang="zh-CN" altLang="en-US" smtClean="0"/>
-              <a:t>2024/5/1</a:t>
+              <a:t>2024/5/2</a:t>
             </a:fld>
             <a:endParaRPr lang="zh-CN" altLang="en-US"/>
           </a:p>
@@ -1421,7 +1421,7 @@
           <a:p>
             <a:fld id="{51FD5836-1B78-4E70-983F-F8F353C30F27}" type="datetimeFigureOut">
               <a:rPr lang="zh-CN" altLang="en-US" smtClean="0"/>
-              <a:t>2024/5/1</a:t>
+              <a:t>2024/5/2</a:t>
             </a:fld>
             <a:endParaRPr lang="zh-CN" altLang="en-US"/>
           </a:p>
@@ -1833,7 +1833,7 @@
           <a:p>
             <a:fld id="{51FD5836-1B78-4E70-983F-F8F353C30F27}" type="datetimeFigureOut">
               <a:rPr lang="zh-CN" altLang="en-US" smtClean="0"/>
-              <a:t>2024/5/1</a:t>
+              <a:t>2024/5/2</a:t>
             </a:fld>
             <a:endParaRPr lang="zh-CN" altLang="en-US"/>
           </a:p>
@@ -1974,7 +1974,7 @@
           <a:p>
             <a:fld id="{51FD5836-1B78-4E70-983F-F8F353C30F27}" type="datetimeFigureOut">
               <a:rPr lang="zh-CN" altLang="en-US" smtClean="0"/>
-              <a:t>2024/5/1</a:t>
+              <a:t>2024/5/2</a:t>
             </a:fld>
             <a:endParaRPr lang="zh-CN" altLang="en-US"/>
           </a:p>
@@ -2087,7 +2087,7 @@
           <a:p>
             <a:fld id="{51FD5836-1B78-4E70-983F-F8F353C30F27}" type="datetimeFigureOut">
               <a:rPr lang="zh-CN" altLang="en-US" smtClean="0"/>
-              <a:t>2024/5/1</a:t>
+              <a:t>2024/5/2</a:t>
             </a:fld>
             <a:endParaRPr lang="zh-CN" altLang="en-US"/>
           </a:p>
@@ -2398,7 +2398,7 @@
           <a:p>
             <a:fld id="{51FD5836-1B78-4E70-983F-F8F353C30F27}" type="datetimeFigureOut">
               <a:rPr lang="zh-CN" altLang="en-US" smtClean="0"/>
-              <a:t>2024/5/1</a:t>
+              <a:t>2024/5/2</a:t>
             </a:fld>
             <a:endParaRPr lang="zh-CN" altLang="en-US"/>
           </a:p>
@@ -2686,7 +2686,7 @@
           <a:p>
             <a:fld id="{51FD5836-1B78-4E70-983F-F8F353C30F27}" type="datetimeFigureOut">
               <a:rPr lang="zh-CN" altLang="en-US" smtClean="0"/>
-              <a:t>2024/5/1</a:t>
+              <a:t>2024/5/2</a:t>
             </a:fld>
             <a:endParaRPr lang="zh-CN" altLang="en-US"/>
           </a:p>
@@ -2927,7 +2927,7 @@
           <a:p>
             <a:fld id="{51FD5836-1B78-4E70-983F-F8F353C30F27}" type="datetimeFigureOut">
               <a:rPr lang="zh-CN" altLang="en-US" smtClean="0"/>
-              <a:t>2024/5/1</a:t>
+              <a:t>2024/5/2</a:t>
             </a:fld>
             <a:endParaRPr lang="zh-CN" altLang="en-US"/>
           </a:p>
@@ -3528,7 +3528,7 @@
             </a:r>
             <a:r>
               <a:rPr lang="en-US" altLang="zh-CN" sz="2000" b="1" dirty="0"/>
-              <a:t>scheduled traffic ST, audio AVB, and best-effort BE traffic</a:t>
+              <a:t>scheduled traffic ST, reserved traffic RT, and best-effort BE traffic</a:t>
             </a:r>
             <a:r>
               <a:rPr lang="en-US" altLang="zh-CN" sz="2000" dirty="0"/>
@@ -3536,14 +3536,34 @@
             </a:r>
           </a:p>
           <a:p>
-            <a:endParaRPr lang="en-US" altLang="zh-CN" sz="2000" dirty="0"/>
-          </a:p>
-          <a:p>
+            <a:r>
+              <a:rPr lang="en-US" altLang="zh-CN" sz="2000" b="1" dirty="0"/>
+              <a:t>ST</a:t>
+            </a:r>
             <a:r>
               <a:rPr lang="en-US" altLang="zh-CN" sz="2000" dirty="0"/>
-              <a:t>The IEEE 802.1Q standard uses 8 different levels of priority, which are used to mark the importance of network traffic.</a:t>
-            </a:r>
-            <a:endParaRPr lang="zh-CN" altLang="en-US" sz="2000" dirty="0"/>
+              <a:t>: industrial automation and control traffic requiring limited latency and zero congestion loss.</a:t>
+            </a:r>
+          </a:p>
+          <a:p>
+            <a:r>
+              <a:rPr lang="en-US" altLang="zh-CN" sz="2000" b="1" dirty="0"/>
+              <a:t>BE</a:t>
+            </a:r>
+            <a:r>
+              <a:rPr lang="en-US" altLang="zh-CN" sz="2000" dirty="0"/>
+              <a:t>: consists of generic Ethernet traffic with no specific Quality of Service (QoS) requirements.</a:t>
+            </a:r>
+          </a:p>
+          <a:p>
+            <a:r>
+              <a:rPr lang="en-US" altLang="zh-CN" sz="2000" b="1" dirty="0"/>
+              <a:t>RT</a:t>
+            </a:r>
+            <a:r>
+              <a:rPr lang="en-US" altLang="zh-CN" sz="2000" dirty="0"/>
+              <a:t>: frames allocated in different time slots with specified bandwidth reservations. (class A and B)</a:t>
+            </a:r>
           </a:p>
         </p:txBody>
       </p:sp>
@@ -3655,7 +3675,7 @@
             <a:pPr lvl="1"/>
             <a:r>
               <a:rPr lang="en-US" altLang="zh-CN" sz="1600" dirty="0"/>
-              <a:t>Each time a transfer is prioritized, the send credit decreases until it eventually reaches negative territory. When transmit credits are in the negative range, data frames that reserve bandwidth may no longer be transmitted. </a:t>
+              <a:t>Each time a transfer is prioritized, the send credit decreases until it eventually reaches negative value. When transmit credits are in the negative range, data frames that reserve bandwidth may no longer be transmitted. </a:t>
             </a:r>
           </a:p>
           <a:p>
@@ -3702,7 +3722,7 @@
         </p:blipFill>
         <p:spPr>
           <a:xfrm>
-            <a:off x="1986189" y="4000850"/>
+            <a:off x="2376418" y="4000850"/>
             <a:ext cx="7439164" cy="2726199"/>
           </a:xfrm>
           <a:prstGeom prst="rect">
@@ -3845,7 +3865,7 @@
             </a:r>
             <a:r>
               <a:rPr lang="en-US" altLang="zh-CN" sz="2000" b="1" dirty="0"/>
-              <a:t>AVB</a:t>
+              <a:t>AVB/RT</a:t>
             </a:r>
             <a:r>
               <a:rPr lang="en-US" altLang="zh-CN" sz="2000" dirty="0"/>
@@ -3899,8 +3919,8 @@
         </p:blipFill>
         <p:spPr>
           <a:xfrm>
-            <a:off x="3736135" y="1694074"/>
-            <a:ext cx="4114286" cy="1238095"/>
+            <a:off x="2469310" y="1569011"/>
+            <a:ext cx="6398466" cy="1925464"/>
           </a:xfrm>
           <a:prstGeom prst="rect">
             <a:avLst/>
@@ -3929,8 +3949,8 @@
         </p:blipFill>
         <p:spPr>
           <a:xfrm>
-            <a:off x="2535859" y="130951"/>
-            <a:ext cx="6838928" cy="3056195"/>
+            <a:off x="2135935" y="1569011"/>
+            <a:ext cx="8827340" cy="3944781"/>
           </a:xfrm>
           <a:prstGeom prst="rect">
             <a:avLst/>
@@ -4297,10 +4317,10 @@
       </p:sp>
       <p:pic>
         <p:nvPicPr>
-          <p:cNvPr id="4" name="图片 3">
-            <a:extLst>
-              <a:ext uri="{FF2B5EF4-FFF2-40B4-BE49-F238E27FC236}">
-                <a16:creationId xmlns:a16="http://schemas.microsoft.com/office/drawing/2014/main" id="{3C9928CD-C55B-3FF5-3854-5077F1665FBD}"/>
+          <p:cNvPr id="5" name="图片 4">
+            <a:extLst>
+              <a:ext uri="{FF2B5EF4-FFF2-40B4-BE49-F238E27FC236}">
+                <a16:creationId xmlns:a16="http://schemas.microsoft.com/office/drawing/2014/main" id="{4AAD01C5-B28E-8B75-754B-68A6D410D08F}"/>
               </a:ext>
             </a:extLst>
           </p:cNvPr>
@@ -4317,8 +4337,8 @@
         </p:blipFill>
         <p:spPr>
           <a:xfrm>
-            <a:off x="4186476" y="4377608"/>
-            <a:ext cx="3819048" cy="2200000"/>
+            <a:off x="2920683" y="4390088"/>
+            <a:ext cx="6487086" cy="2243600"/>
           </a:xfrm>
           <a:prstGeom prst="rect">
             <a:avLst/>
@@ -4565,6 +4585,26 @@
             <a:r>
               <a:rPr lang="en-US" altLang="zh-CN" dirty="0" err="1"/>
               <a:t>Qcr</a:t>
+            </a:r>
+            <a:endParaRPr lang="en-US" altLang="zh-CN" dirty="0"/>
+          </a:p>
+          <a:p>
+            <a:r>
+              <a:rPr lang="en-US" altLang="zh-CN"/>
+              <a:t>ATS </a:t>
+            </a:r>
+            <a:r>
+              <a:rPr lang="en-US" altLang="zh-CN" b="0" i="0">
+                <a:solidFill>
+                  <a:srgbClr val="4D5156"/>
+                </a:solidFill>
+                <a:effectLst/>
+                <a:highlight>
+                  <a:srgbClr val="FFFFFF"/>
+                </a:highlight>
+                <a:latin typeface="arial" panose="020B0604020202020204" pitchFamily="34" charset="0"/>
+              </a:rPr>
+              <a:t>Asynchronous Traffic Shaper</a:t>
             </a:r>
             <a:endParaRPr lang="en-US" altLang="zh-CN" dirty="0"/>
           </a:p>

</xml_diff>